<commit_message>
email Campaign | A/B Test
</commit_message>
<xml_diff>
--- a/email_campaign/Presentation.pptx
+++ b/email_campaign/Presentation.pptx
@@ -5,7 +5,7 @@
     <p:sldMasterId id="2147484453" r:id="rId1"/>
   </p:sldMasterIdLst>
   <p:notesMasterIdLst>
-    <p:notesMasterId r:id="rId12"/>
+    <p:notesMasterId r:id="rId13"/>
   </p:notesMasterIdLst>
   <p:sldIdLst>
     <p:sldId id="256" r:id="rId2"/>
@@ -17,7 +17,8 @@
     <p:sldId id="327" r:id="rId8"/>
     <p:sldId id="328" r:id="rId9"/>
     <p:sldId id="329" r:id="rId10"/>
-    <p:sldId id="290" r:id="rId11"/>
+    <p:sldId id="306" r:id="rId11"/>
+    <p:sldId id="290" r:id="rId12"/>
   </p:sldIdLst>
   <p:sldSz cx="12192000" cy="6858000"/>
   <p:notesSz cx="9144000" cy="6858000"/>
@@ -130,6 +131,7 @@
             <p14:sldId id="327"/>
             <p14:sldId id="328"/>
             <p14:sldId id="329"/>
+            <p14:sldId id="306"/>
             <p14:sldId id="290"/>
           </p14:sldIdLst>
         </p14:section>
@@ -2851,7 +2853,7 @@
           <a:p>
             <a:fld id="{66907B59-4645-C54B-8DF0-15B3DFA298BB}" type="datetimeFigureOut">
               <a:rPr lang="en-US" smtClean="0"/>
-              <a:t>9/21/21</a:t>
+              <a:t>9/22/21</a:t>
             </a:fld>
             <a:endParaRPr lang="en-US" dirty="0"/>
           </a:p>
@@ -3519,7 +3521,7 @@
           <a:p>
             <a:fld id="{766C6F04-8709-2A46-ACB5-99ACA6D3D3E5}" type="slidenum">
               <a:rPr lang="en-US" smtClean="0"/>
-              <a:t>10</a:t>
+              <a:t>11</a:t>
             </a:fld>
             <a:endParaRPr lang="en-US" dirty="0"/>
           </a:p>
@@ -3694,7 +3696,7 @@
             <a:fld id="{B61BEF0D-F0BB-DE4B-95CE-6DB70DBA9567}" type="datetimeFigureOut">
               <a:rPr lang="en-US" smtClean="0"/>
               <a:pPr/>
-              <a:t>9/21/21</a:t>
+              <a:t>9/22/21</a:t>
             </a:fld>
             <a:endParaRPr lang="en-US" dirty="0"/>
           </a:p>
@@ -3866,7 +3868,7 @@
             <a:fld id="{B61BEF0D-F0BB-DE4B-95CE-6DB70DBA9567}" type="datetimeFigureOut">
               <a:rPr lang="en-US" smtClean="0"/>
               <a:pPr/>
-              <a:t>9/21/21</a:t>
+              <a:t>9/22/21</a:t>
             </a:fld>
             <a:endParaRPr lang="en-US" dirty="0"/>
           </a:p>
@@ -4048,7 +4050,7 @@
             <a:fld id="{B61BEF0D-F0BB-DE4B-95CE-6DB70DBA9567}" type="datetimeFigureOut">
               <a:rPr lang="en-US" smtClean="0"/>
               <a:pPr/>
-              <a:t>9/21/21</a:t>
+              <a:t>9/22/21</a:t>
             </a:fld>
             <a:endParaRPr lang="en-US" dirty="0"/>
           </a:p>
@@ -4220,7 +4222,7 @@
             <a:fld id="{B61BEF0D-F0BB-DE4B-95CE-6DB70DBA9567}" type="datetimeFigureOut">
               <a:rPr lang="en-US" smtClean="0"/>
               <a:pPr/>
-              <a:t>9/21/21</a:t>
+              <a:t>9/22/21</a:t>
             </a:fld>
             <a:endParaRPr lang="en-US" dirty="0"/>
           </a:p>
@@ -4482,7 +4484,7 @@
             <a:fld id="{B61BEF0D-F0BB-DE4B-95CE-6DB70DBA9567}" type="datetimeFigureOut">
               <a:rPr lang="en-US" smtClean="0"/>
               <a:pPr/>
-              <a:t>9/21/21</a:t>
+              <a:t>9/22/21</a:t>
             </a:fld>
             <a:endParaRPr lang="en-US" dirty="0"/>
           </a:p>
@@ -4716,7 +4718,7 @@
             <a:fld id="{B61BEF0D-F0BB-DE4B-95CE-6DB70DBA9567}" type="datetimeFigureOut">
               <a:rPr lang="en-US" smtClean="0"/>
               <a:pPr/>
-              <a:t>9/21/21</a:t>
+              <a:t>9/22/21</a:t>
             </a:fld>
             <a:endParaRPr lang="en-US" dirty="0"/>
           </a:p>
@@ -5078,7 +5080,7 @@
             <a:fld id="{B61BEF0D-F0BB-DE4B-95CE-6DB70DBA9567}" type="datetimeFigureOut">
               <a:rPr lang="en-US" smtClean="0"/>
               <a:pPr/>
-              <a:t>9/21/21</a:t>
+              <a:t>9/22/21</a:t>
             </a:fld>
             <a:endParaRPr lang="en-US" dirty="0"/>
           </a:p>
@@ -5221,7 +5223,7 @@
             <a:fld id="{B61BEF0D-F0BB-DE4B-95CE-6DB70DBA9567}" type="datetimeFigureOut">
               <a:rPr lang="en-US" smtClean="0"/>
               <a:pPr/>
-              <a:t>9/21/21</a:t>
+              <a:t>9/22/21</a:t>
             </a:fld>
             <a:endParaRPr lang="en-US" dirty="0"/>
           </a:p>
@@ -5318,7 +5320,7 @@
             <a:fld id="{B61BEF0D-F0BB-DE4B-95CE-6DB70DBA9567}" type="datetimeFigureOut">
               <a:rPr lang="en-US" smtClean="0"/>
               <a:pPr/>
-              <a:t>9/21/21</a:t>
+              <a:t>9/22/21</a:t>
             </a:fld>
             <a:endParaRPr lang="en-US" dirty="0"/>
           </a:p>
@@ -5677,7 +5679,7 @@
             <a:fld id="{B61BEF0D-F0BB-DE4B-95CE-6DB70DBA9567}" type="datetimeFigureOut">
               <a:rPr lang="en-US" smtClean="0"/>
               <a:pPr/>
-              <a:t>9/21/21</a:t>
+              <a:t>9/22/21</a:t>
             </a:fld>
             <a:endParaRPr lang="en-US" dirty="0"/>
           </a:p>
@@ -6001,7 +6003,7 @@
             <a:fld id="{B61BEF0D-F0BB-DE4B-95CE-6DB70DBA9567}" type="datetimeFigureOut">
               <a:rPr lang="en-US" smtClean="0"/>
               <a:pPr/>
-              <a:t>9/21/21</a:t>
+              <a:t>9/22/21</a:t>
             </a:fld>
             <a:endParaRPr lang="en-US" dirty="0"/>
           </a:p>
@@ -6248,7 +6250,7 @@
             <a:fld id="{B61BEF0D-F0BB-DE4B-95CE-6DB70DBA9567}" type="datetimeFigureOut">
               <a:rPr lang="en-US" smtClean="0"/>
               <a:pPr/>
-              <a:t>9/21/21</a:t>
+              <a:t>9/22/21</a:t>
             </a:fld>
             <a:endParaRPr lang="en-US" dirty="0"/>
           </a:p>
@@ -6796,6 +6798,120 @@
 </file>
 
 <file path=ppt/slides/slide10.xml><?xml version="1.0" encoding="utf-8"?>
+<p:sld xmlns:a="http://schemas.openxmlformats.org/drawingml/2006/main" xmlns:r="http://schemas.openxmlformats.org/officeDocument/2006/relationships" xmlns:p="http://schemas.openxmlformats.org/presentationml/2006/main">
+  <p:cSld>
+    <p:spTree>
+      <p:nvGrpSpPr>
+        <p:cNvPr id="1" name=""/>
+        <p:cNvGrpSpPr/>
+        <p:nvPr/>
+      </p:nvGrpSpPr>
+      <p:grpSpPr>
+        <a:xfrm>
+          <a:off x="0" y="0"/>
+          <a:ext cx="0" cy="0"/>
+          <a:chOff x="0" y="0"/>
+          <a:chExt cx="0" cy="0"/>
+        </a:xfrm>
+      </p:grpSpPr>
+      <p:sp>
+        <p:nvSpPr>
+          <p:cNvPr id="2" name="Title 1">
+            <a:extLst>
+              <a:ext uri="{FF2B5EF4-FFF2-40B4-BE49-F238E27FC236}">
+                <a16:creationId xmlns:a16="http://schemas.microsoft.com/office/drawing/2014/main" id="{34D0E1BA-E078-7E44-B3C9-A5C925561585}"/>
+              </a:ext>
+            </a:extLst>
+          </p:cNvPr>
+          <p:cNvSpPr>
+            <a:spLocks noGrp="1"/>
+          </p:cNvSpPr>
+          <p:nvPr>
+            <p:ph type="title"/>
+          </p:nvPr>
+        </p:nvSpPr>
+        <p:spPr/>
+        <p:txBody>
+          <a:bodyPr vert="horz" lIns="182880" tIns="182880" rIns="182880" bIns="182880" rtlCol="0" anchor="ctr">
+            <a:normAutofit/>
+          </a:bodyPr>
+          <a:lstStyle/>
+          <a:p>
+            <a:r>
+              <a:rPr lang="en-US" dirty="0"/>
+              <a:t>Conclusions</a:t>
+            </a:r>
+          </a:p>
+        </p:txBody>
+      </p:sp>
+      <p:sp>
+        <p:nvSpPr>
+          <p:cNvPr id="3" name="Content Placeholder 2">
+            <a:extLst>
+              <a:ext uri="{FF2B5EF4-FFF2-40B4-BE49-F238E27FC236}">
+                <a16:creationId xmlns:a16="http://schemas.microsoft.com/office/drawing/2014/main" id="{184BC2C0-3893-B94D-8A24-A058163BB642}"/>
+              </a:ext>
+            </a:extLst>
+          </p:cNvPr>
+          <p:cNvSpPr>
+            <a:spLocks noGrp="1"/>
+          </p:cNvSpPr>
+          <p:nvPr>
+            <p:ph sz="half" idx="1"/>
+          </p:nvPr>
+        </p:nvSpPr>
+        <p:spPr>
+          <a:xfrm>
+            <a:off x="2231136" y="2403868"/>
+            <a:ext cx="7729729" cy="3101982"/>
+          </a:xfrm>
+        </p:spPr>
+        <p:txBody>
+          <a:bodyPr vert="horz" lIns="91440" tIns="45720" rIns="91440" bIns="45720" rtlCol="0">
+            <a:normAutofit/>
+          </a:bodyPr>
+          <a:lstStyle/>
+          <a:p>
+            <a:r>
+              <a:rPr lang="en-US" sz="2000" dirty="0"/>
+              <a:t>The result of the test of means analysis gives a p-value &lt; 0.05, that indicates there is a statistically significance difference between group means</a:t>
+            </a:r>
+          </a:p>
+          <a:p>
+            <a:r>
+              <a:rPr lang="en-US" sz="2000" dirty="0"/>
+              <a:t>The p-value provides strong evidence that the increment on making-decision rate did not happen by chance</a:t>
+            </a:r>
+          </a:p>
+          <a:p>
+            <a:r>
+              <a:rPr lang="en-US" sz="2000" dirty="0"/>
+              <a:t>The overall result shows that there could be an increment on the make decision rate so, my recommendation is to rollout the email strategy in the rest of the markets</a:t>
+            </a:r>
+          </a:p>
+          <a:p>
+            <a:pPr lvl="1"/>
+            <a:endParaRPr lang="en-US" sz="1800" dirty="0"/>
+          </a:p>
+          <a:p>
+            <a:endParaRPr lang="en-US" dirty="0"/>
+          </a:p>
+        </p:txBody>
+      </p:sp>
+    </p:spTree>
+    <p:extLst>
+      <p:ext uri="{BB962C8B-B14F-4D97-AF65-F5344CB8AC3E}">
+        <p14:creationId xmlns:p14="http://schemas.microsoft.com/office/powerpoint/2010/main" val="1288979705"/>
+      </p:ext>
+    </p:extLst>
+  </p:cSld>
+  <p:clrMapOvr>
+    <a:masterClrMapping/>
+  </p:clrMapOvr>
+</p:sld>
+</file>
+
+<file path=ppt/slides/slide11.xml><?xml version="1.0" encoding="utf-8"?>
 <p:sld xmlns:a="http://schemas.openxmlformats.org/drawingml/2006/main" xmlns:r="http://schemas.openxmlformats.org/officeDocument/2006/relationships" xmlns:p="http://schemas.openxmlformats.org/presentationml/2006/main">
   <p:cSld>
     <p:spTree>

</xml_diff>

<commit_message>
A/B Test Analysis - email Campaign
</commit_message>
<xml_diff>
--- a/email_campaign/Presentation.pptx
+++ b/email_campaign/Presentation.pptx
@@ -7085,34 +7085,13 @@
           <a:p>
             <a:r>
               <a:rPr lang="en-US" sz="2000" dirty="0"/>
-              <a:t>email Strategy</a:t>
-            </a:r>
-          </a:p>
-          <a:p>
-            <a:pPr lvl="1"/>
-            <a:r>
-              <a:rPr lang="en-US" sz="1800" dirty="0"/>
-              <a:t>email Strategy Results</a:t>
-            </a:r>
-          </a:p>
-          <a:p>
-            <a:pPr lvl="1"/>
-            <a:r>
-              <a:rPr lang="en-US" sz="1800" dirty="0"/>
-              <a:t>email and customer’s behavior</a:t>
-            </a:r>
-          </a:p>
-          <a:p>
-            <a:pPr lvl="1"/>
-            <a:r>
-              <a:rPr lang="en-US" sz="1800" dirty="0"/>
-              <a:t>email strategy impact on the other functional teams</a:t>
+              <a:t>email Campaign</a:t>
             </a:r>
           </a:p>
           <a:p>
             <a:r>
               <a:rPr lang="en-US" sz="2000" dirty="0"/>
-              <a:t>Findings and Recommendations</a:t>
+              <a:t>Conclusions</a:t>
             </a:r>
           </a:p>
         </p:txBody>
@@ -7225,7 +7204,7 @@
             </a:pPr>
             <a:r>
               <a:rPr lang="en-US" dirty="0"/>
-              <a:t>This document contains the A/B test analysis of a email campaign.</a:t>
+              <a:t>This document contains the A/B test analysis of an email campaign.</a:t>
             </a:r>
           </a:p>
           <a:p>
@@ -7804,7 +7783,7 @@
                   </a:schemeClr>
                 </a:solidFill>
               </a:rPr>
-              <a:t>Lo Angeles: 59,895</a:t>
+              <a:t>Los Angeles: 59,895</a:t>
             </a:r>
           </a:p>
           <a:p>
@@ -7864,7 +7843,7 @@
                   </a:schemeClr>
                 </a:solidFill>
               </a:rPr>
-              <a:t>61,4,84 customers did make a decision</a:t>
+              <a:t>61,4,84 customers make a decision</a:t>
             </a:r>
           </a:p>
           <a:p>
@@ -8295,14 +8274,14 @@
             <p:ph idx="1"/>
             <p:extLst>
               <p:ext uri="{D42A27DB-BD31-4B8C-83A1-F6EECF244321}">
-                <p14:modId xmlns:p14="http://schemas.microsoft.com/office/powerpoint/2010/main" val="1591731655"/>
+                <p14:modId xmlns:p14="http://schemas.microsoft.com/office/powerpoint/2010/main" val="3782887701"/>
               </p:ext>
             </p:extLst>
           </p:nvPr>
         </p:nvGraphicFramePr>
         <p:xfrm>
           <a:off x="4823366" y="2135276"/>
-          <a:ext cx="6227067" cy="2595392"/>
+          <a:ext cx="6227067" cy="2852382"/>
         </p:xfrm>
         <a:graphic>
           <a:graphicData uri="http://schemas.openxmlformats.org/drawingml/2006/table">
@@ -8469,7 +8448,7 @@
                         <a:rPr lang="en-US" sz="1800" u="none" strike="noStrike" dirty="0">
                           <a:effectLst/>
                         </a:rPr>
-                        <a:t>of customers did shop home</a:t>
+                        <a:t>of customers who make a decision</a:t>
                       </a:r>
                       <a:endParaRPr lang="en-US" sz="1800" b="1" i="0" u="none" strike="noStrike" dirty="0">
                         <a:solidFill>
@@ -13434,36 +13413,6 @@
           </a:graphicData>
         </a:graphic>
       </p:graphicFrame>
-      <p:pic>
-        <p:nvPicPr>
-          <p:cNvPr id="16" name="Picture 15" descr="Chart, waterfall chart&#10;&#10;Description automatically generated">
-            <a:extLst>
-              <a:ext uri="{FF2B5EF4-FFF2-40B4-BE49-F238E27FC236}">
-                <a16:creationId xmlns:a16="http://schemas.microsoft.com/office/drawing/2014/main" id="{0A15E24C-5DE0-4E49-AB9D-668017D6C14E}"/>
-              </a:ext>
-            </a:extLst>
-          </p:cNvPr>
-          <p:cNvPicPr>
-            <a:picLocks noChangeAspect="1"/>
-          </p:cNvPicPr>
-          <p:nvPr/>
-        </p:nvPicPr>
-        <p:blipFill>
-          <a:blip r:embed="rId2"/>
-          <a:stretch>
-            <a:fillRect/>
-          </a:stretch>
-        </p:blipFill>
-        <p:spPr>
-          <a:xfrm>
-            <a:off x="4918013" y="5929976"/>
-            <a:ext cx="963735" cy="703851"/>
-          </a:xfrm>
-          <a:prstGeom prst="rect">
-            <a:avLst/>
-          </a:prstGeom>
-        </p:spPr>
-      </p:pic>
       <p:sp>
         <p:nvSpPr>
           <p:cNvPr id="17" name="TextBox 16">
@@ -13499,6 +13448,36 @@
           </a:p>
         </p:txBody>
       </p:sp>
+      <p:pic>
+        <p:nvPicPr>
+          <p:cNvPr id="4" name="Picture 3" descr="Graphical user interface, text, application&#10;&#10;Description automatically generated">
+            <a:extLst>
+              <a:ext uri="{FF2B5EF4-FFF2-40B4-BE49-F238E27FC236}">
+                <a16:creationId xmlns:a16="http://schemas.microsoft.com/office/drawing/2014/main" id="{F88E882B-F405-6845-8A18-3A78F9098DA2}"/>
+              </a:ext>
+            </a:extLst>
+          </p:cNvPr>
+          <p:cNvPicPr>
+            <a:picLocks noChangeAspect="1"/>
+          </p:cNvPicPr>
+          <p:nvPr/>
+        </p:nvPicPr>
+        <p:blipFill>
+          <a:blip r:embed="rId2"/>
+          <a:stretch>
+            <a:fillRect/>
+          </a:stretch>
+        </p:blipFill>
+        <p:spPr>
+          <a:xfrm>
+            <a:off x="5294373" y="5723403"/>
+            <a:ext cx="1270000" cy="647700"/>
+          </a:xfrm>
+          <a:prstGeom prst="rect">
+            <a:avLst/>
+          </a:prstGeom>
+        </p:spPr>
+      </p:pic>
     </p:spTree>
     <p:extLst>
       <p:ext uri="{BB962C8B-B14F-4D97-AF65-F5344CB8AC3E}">

</xml_diff>